<commit_message>
New image to describe policy approach
</commit_message>
<xml_diff>
--- a/images/Images-Source.pptx
+++ b/images/Images-Source.pptx
@@ -6,6 +6,7 @@
   </p:sldMasterIdLst>
   <p:sldIdLst>
     <p:sldId id="256" r:id="rId2"/>
+    <p:sldId id="257" r:id="rId3"/>
   </p:sldIdLst>
   <p:sldSz cx="12192000" cy="6858000"/>
   <p:notesSz cx="6858000" cy="9144000"/>
@@ -104,6 +105,11 @@
       </a:defRPr>
     </a:lvl9pPr>
   </p:defaultTextStyle>
+  <p:extLst>
+    <p:ext uri="{EFAFB233-063F-42B5-8137-9DF3F51BA10A}">
+      <p15:sldGuideLst xmlns:p15="http://schemas.microsoft.com/office/powerpoint/2012/main"/>
+    </p:ext>
+  </p:extLst>
 </p:presentation>
 </file>
 
@@ -256,7 +262,7 @@
           <a:p>
             <a:fld id="{47D50058-43AF-4E45-8EB1-CF9F0106372A}" type="datetimeFigureOut">
               <a:rPr lang="en-US" smtClean="0"/>
-              <a:t>6/16/2021</a:t>
+              <a:t>6/22/2021</a:t>
             </a:fld>
             <a:endParaRPr lang="en-US"/>
           </a:p>
@@ -456,7 +462,7 @@
           <a:p>
             <a:fld id="{47D50058-43AF-4E45-8EB1-CF9F0106372A}" type="datetimeFigureOut">
               <a:rPr lang="en-US" smtClean="0"/>
-              <a:t>6/16/2021</a:t>
+              <a:t>6/22/2021</a:t>
             </a:fld>
             <a:endParaRPr lang="en-US"/>
           </a:p>
@@ -666,7 +672,7 @@
           <a:p>
             <a:fld id="{47D50058-43AF-4E45-8EB1-CF9F0106372A}" type="datetimeFigureOut">
               <a:rPr lang="en-US" smtClean="0"/>
-              <a:t>6/16/2021</a:t>
+              <a:t>6/22/2021</a:t>
             </a:fld>
             <a:endParaRPr lang="en-US"/>
           </a:p>
@@ -866,7 +872,7 @@
           <a:p>
             <a:fld id="{47D50058-43AF-4E45-8EB1-CF9F0106372A}" type="datetimeFigureOut">
               <a:rPr lang="en-US" smtClean="0"/>
-              <a:t>6/16/2021</a:t>
+              <a:t>6/22/2021</a:t>
             </a:fld>
             <a:endParaRPr lang="en-US"/>
           </a:p>
@@ -1142,7 +1148,7 @@
           <a:p>
             <a:fld id="{47D50058-43AF-4E45-8EB1-CF9F0106372A}" type="datetimeFigureOut">
               <a:rPr lang="en-US" smtClean="0"/>
-              <a:t>6/16/2021</a:t>
+              <a:t>6/22/2021</a:t>
             </a:fld>
             <a:endParaRPr lang="en-US"/>
           </a:p>
@@ -1410,7 +1416,7 @@
           <a:p>
             <a:fld id="{47D50058-43AF-4E45-8EB1-CF9F0106372A}" type="datetimeFigureOut">
               <a:rPr lang="en-US" smtClean="0"/>
-              <a:t>6/16/2021</a:t>
+              <a:t>6/22/2021</a:t>
             </a:fld>
             <a:endParaRPr lang="en-US"/>
           </a:p>
@@ -1825,7 +1831,7 @@
           <a:p>
             <a:fld id="{47D50058-43AF-4E45-8EB1-CF9F0106372A}" type="datetimeFigureOut">
               <a:rPr lang="en-US" smtClean="0"/>
-              <a:t>6/16/2021</a:t>
+              <a:t>6/22/2021</a:t>
             </a:fld>
             <a:endParaRPr lang="en-US"/>
           </a:p>
@@ -1967,7 +1973,7 @@
           <a:p>
             <a:fld id="{47D50058-43AF-4E45-8EB1-CF9F0106372A}" type="datetimeFigureOut">
               <a:rPr lang="en-US" smtClean="0"/>
-              <a:t>6/16/2021</a:t>
+              <a:t>6/22/2021</a:t>
             </a:fld>
             <a:endParaRPr lang="en-US"/>
           </a:p>
@@ -2080,7 +2086,7 @@
           <a:p>
             <a:fld id="{47D50058-43AF-4E45-8EB1-CF9F0106372A}" type="datetimeFigureOut">
               <a:rPr lang="en-US" smtClean="0"/>
-              <a:t>6/16/2021</a:t>
+              <a:t>6/22/2021</a:t>
             </a:fld>
             <a:endParaRPr lang="en-US"/>
           </a:p>
@@ -2393,7 +2399,7 @@
           <a:p>
             <a:fld id="{47D50058-43AF-4E45-8EB1-CF9F0106372A}" type="datetimeFigureOut">
               <a:rPr lang="en-US" smtClean="0"/>
-              <a:t>6/16/2021</a:t>
+              <a:t>6/22/2021</a:t>
             </a:fld>
             <a:endParaRPr lang="en-US"/>
           </a:p>
@@ -2682,7 +2688,7 @@
           <a:p>
             <a:fld id="{47D50058-43AF-4E45-8EB1-CF9F0106372A}" type="datetimeFigureOut">
               <a:rPr lang="en-US" smtClean="0"/>
-              <a:t>6/16/2021</a:t>
+              <a:t>6/22/2021</a:t>
             </a:fld>
             <a:endParaRPr lang="en-US"/>
           </a:p>
@@ -2925,7 +2931,7 @@
           <a:p>
             <a:fld id="{47D50058-43AF-4E45-8EB1-CF9F0106372A}" type="datetimeFigureOut">
               <a:rPr lang="en-US" smtClean="0"/>
-              <a:t>6/16/2021</a:t>
+              <a:t>6/22/2021</a:t>
             </a:fld>
             <a:endParaRPr lang="en-US"/>
           </a:p>
@@ -4111,6 +4117,439 @@
 </p:sld>
 </file>
 
+<file path=ppt/slides/slide2.xml><?xml version="1.0" encoding="utf-8"?>
+<p:sld xmlns:a="http://schemas.openxmlformats.org/drawingml/2006/main" xmlns:r="http://schemas.openxmlformats.org/officeDocument/2006/relationships" xmlns:p="http://schemas.openxmlformats.org/presentationml/2006/main">
+  <p:cSld>
+    <p:spTree>
+      <p:nvGrpSpPr>
+        <p:cNvPr id="1" name=""/>
+        <p:cNvGrpSpPr/>
+        <p:nvPr/>
+      </p:nvGrpSpPr>
+      <p:grpSpPr>
+        <a:xfrm>
+          <a:off x="0" y="0"/>
+          <a:ext cx="0" cy="0"/>
+          <a:chOff x="0" y="0"/>
+          <a:chExt cx="0" cy="0"/>
+        </a:xfrm>
+      </p:grpSpPr>
+      <p:pic>
+        <p:nvPicPr>
+          <p:cNvPr id="3" name="Grafik 2">
+            <a:extLst>
+              <a:ext uri="{FF2B5EF4-FFF2-40B4-BE49-F238E27FC236}">
+                <a16:creationId xmlns:a16="http://schemas.microsoft.com/office/drawing/2014/main" id="{2CED4407-CE7A-426F-AE13-C32F91629A64}"/>
+              </a:ext>
+            </a:extLst>
+          </p:cNvPr>
+          <p:cNvPicPr>
+            <a:picLocks noChangeAspect="1"/>
+          </p:cNvPicPr>
+          <p:nvPr/>
+        </p:nvPicPr>
+        <p:blipFill>
+          <a:blip r:embed="rId2"/>
+          <a:stretch>
+            <a:fillRect/>
+          </a:stretch>
+        </p:blipFill>
+        <p:spPr>
+          <a:xfrm>
+            <a:off x="3543630" y="2386768"/>
+            <a:ext cx="2578012" cy="2190098"/>
+          </a:xfrm>
+          <a:prstGeom prst="rect">
+            <a:avLst/>
+          </a:prstGeom>
+        </p:spPr>
+      </p:pic>
+      <p:pic>
+        <p:nvPicPr>
+          <p:cNvPr id="5" name="Grafik 4">
+            <a:extLst>
+              <a:ext uri="{FF2B5EF4-FFF2-40B4-BE49-F238E27FC236}">
+                <a16:creationId xmlns:a16="http://schemas.microsoft.com/office/drawing/2014/main" id="{789A4793-5396-4F71-AAE5-E515B9B6A6F7}"/>
+              </a:ext>
+            </a:extLst>
+          </p:cNvPr>
+          <p:cNvPicPr>
+            <a:picLocks noChangeAspect="1"/>
+          </p:cNvPicPr>
+          <p:nvPr/>
+        </p:nvPicPr>
+        <p:blipFill rotWithShape="1">
+          <a:blip r:embed="rId3"/>
+          <a:srcRect l="31696" r="29029"/>
+          <a:stretch/>
+        </p:blipFill>
+        <p:spPr>
+          <a:xfrm>
+            <a:off x="1366978" y="2870588"/>
+            <a:ext cx="1606361" cy="1379916"/>
+          </a:xfrm>
+          <a:prstGeom prst="rect">
+            <a:avLst/>
+          </a:prstGeom>
+          <a:ln w="6350">
+            <a:solidFill>
+              <a:schemeClr val="tx1"/>
+            </a:solidFill>
+          </a:ln>
+        </p:spPr>
+      </p:pic>
+      <p:sp>
+        <p:nvSpPr>
+          <p:cNvPr id="6" name="Rechteck 5">
+            <a:extLst>
+              <a:ext uri="{FF2B5EF4-FFF2-40B4-BE49-F238E27FC236}">
+                <a16:creationId xmlns:a16="http://schemas.microsoft.com/office/drawing/2014/main" id="{59560786-0BD4-4026-9802-C222B06B8F2C}"/>
+              </a:ext>
+            </a:extLst>
+          </p:cNvPr>
+          <p:cNvSpPr/>
+          <p:nvPr/>
+        </p:nvSpPr>
+        <p:spPr>
+          <a:xfrm>
+            <a:off x="1423951" y="3338258"/>
+            <a:ext cx="1270388" cy="265246"/>
+          </a:xfrm>
+          <a:prstGeom prst="rect">
+            <a:avLst/>
+          </a:prstGeom>
+          <a:noFill/>
+          <a:ln w="19050">
+            <a:solidFill>
+              <a:srgbClr val="C00000"/>
+            </a:solidFill>
+          </a:ln>
+        </p:spPr>
+        <p:style>
+          <a:lnRef idx="2">
+            <a:schemeClr val="accent1">
+              <a:shade val="50000"/>
+            </a:schemeClr>
+          </a:lnRef>
+          <a:fillRef idx="1">
+            <a:schemeClr val="accent1"/>
+          </a:fillRef>
+          <a:effectRef idx="0">
+            <a:schemeClr val="accent1"/>
+          </a:effectRef>
+          <a:fontRef idx="minor">
+            <a:schemeClr val="lt1"/>
+          </a:fontRef>
+        </p:style>
+        <p:txBody>
+          <a:bodyPr rtlCol="0" anchor="ctr"/>
+          <a:lstStyle/>
+          <a:p>
+            <a:pPr algn="ctr"/>
+            <a:endParaRPr lang="en-US"/>
+          </a:p>
+        </p:txBody>
+      </p:sp>
+      <p:cxnSp>
+        <p:nvCxnSpPr>
+          <p:cNvPr id="8" name="Gerade Verbindung mit Pfeil 7">
+            <a:extLst>
+              <a:ext uri="{FF2B5EF4-FFF2-40B4-BE49-F238E27FC236}">
+                <a16:creationId xmlns:a16="http://schemas.microsoft.com/office/drawing/2014/main" id="{CD116BD1-E821-40CA-8419-9F940F637544}"/>
+              </a:ext>
+            </a:extLst>
+          </p:cNvPr>
+          <p:cNvCxnSpPr>
+            <a:cxnSpLocks/>
+            <a:stCxn id="6" idx="3"/>
+          </p:cNvCxnSpPr>
+          <p:nvPr/>
+        </p:nvCxnSpPr>
+        <p:spPr>
+          <a:xfrm flipV="1">
+            <a:off x="2694339" y="3463901"/>
+            <a:ext cx="2003303" cy="6980"/>
+          </a:xfrm>
+          <a:prstGeom prst="straightConnector1">
+            <a:avLst/>
+          </a:prstGeom>
+          <a:ln w="19050">
+            <a:solidFill>
+              <a:srgbClr val="C00000"/>
+            </a:solidFill>
+            <a:tailEnd type="triangle"/>
+          </a:ln>
+        </p:spPr>
+        <p:style>
+          <a:lnRef idx="1">
+            <a:schemeClr val="accent1"/>
+          </a:lnRef>
+          <a:fillRef idx="0">
+            <a:schemeClr val="accent1"/>
+          </a:fillRef>
+          <a:effectRef idx="0">
+            <a:schemeClr val="accent1"/>
+          </a:effectRef>
+          <a:fontRef idx="minor">
+            <a:schemeClr val="tx1"/>
+          </a:fontRef>
+        </p:style>
+      </p:cxnSp>
+      <p:pic>
+        <p:nvPicPr>
+          <p:cNvPr id="10" name="Grafik 9">
+            <a:extLst>
+              <a:ext uri="{FF2B5EF4-FFF2-40B4-BE49-F238E27FC236}">
+                <a16:creationId xmlns:a16="http://schemas.microsoft.com/office/drawing/2014/main" id="{E3138000-F840-4444-9DE9-815C6F678650}"/>
+              </a:ext>
+            </a:extLst>
+          </p:cNvPr>
+          <p:cNvPicPr>
+            <a:picLocks noChangeAspect="1"/>
+          </p:cNvPicPr>
+          <p:nvPr/>
+        </p:nvPicPr>
+        <p:blipFill rotWithShape="1">
+          <a:blip r:embed="rId4"/>
+          <a:srcRect r="23741"/>
+          <a:stretch/>
+        </p:blipFill>
+        <p:spPr>
+          <a:xfrm>
+            <a:off x="6791902" y="3429000"/>
+            <a:ext cx="3475903" cy="1332882"/>
+          </a:xfrm>
+          <a:prstGeom prst="rect">
+            <a:avLst/>
+          </a:prstGeom>
+          <a:ln>
+            <a:solidFill>
+              <a:schemeClr val="tx1"/>
+            </a:solidFill>
+          </a:ln>
+        </p:spPr>
+      </p:pic>
+      <p:cxnSp>
+        <p:nvCxnSpPr>
+          <p:cNvPr id="11" name="Gerade Verbindung mit Pfeil 10">
+            <a:extLst>
+              <a:ext uri="{FF2B5EF4-FFF2-40B4-BE49-F238E27FC236}">
+                <a16:creationId xmlns:a16="http://schemas.microsoft.com/office/drawing/2014/main" id="{56E0F80E-62A7-463A-BECE-3E9171FF595C}"/>
+              </a:ext>
+            </a:extLst>
+          </p:cNvPr>
+          <p:cNvCxnSpPr>
+            <a:cxnSpLocks/>
+            <a:endCxn id="10" idx="1"/>
+          </p:cNvCxnSpPr>
+          <p:nvPr/>
+        </p:nvCxnSpPr>
+        <p:spPr>
+          <a:xfrm>
+            <a:off x="5730705" y="3470881"/>
+            <a:ext cx="1061197" cy="624560"/>
+          </a:xfrm>
+          <a:prstGeom prst="straightConnector1">
+            <a:avLst/>
+          </a:prstGeom>
+          <a:ln w="19050">
+            <a:solidFill>
+              <a:srgbClr val="C00000"/>
+            </a:solidFill>
+            <a:tailEnd type="triangle"/>
+          </a:ln>
+        </p:spPr>
+        <p:style>
+          <a:lnRef idx="1">
+            <a:schemeClr val="accent1"/>
+          </a:lnRef>
+          <a:fillRef idx="0">
+            <a:schemeClr val="accent1"/>
+          </a:fillRef>
+          <a:effectRef idx="0">
+            <a:schemeClr val="accent1"/>
+          </a:effectRef>
+          <a:fontRef idx="minor">
+            <a:schemeClr val="tx1"/>
+          </a:fontRef>
+        </p:style>
+      </p:cxnSp>
+      <p:pic>
+        <p:nvPicPr>
+          <p:cNvPr id="17" name="Grafik 16">
+            <a:extLst>
+              <a:ext uri="{FF2B5EF4-FFF2-40B4-BE49-F238E27FC236}">
+                <a16:creationId xmlns:a16="http://schemas.microsoft.com/office/drawing/2014/main" id="{F8A71441-82B7-49A1-8D3D-6E5C6AA77B3C}"/>
+              </a:ext>
+            </a:extLst>
+          </p:cNvPr>
+          <p:cNvPicPr>
+            <a:picLocks noChangeAspect="1"/>
+          </p:cNvPicPr>
+          <p:nvPr/>
+        </p:nvPicPr>
+        <p:blipFill rotWithShape="1">
+          <a:blip r:embed="rId5"/>
+          <a:srcRect r="15165"/>
+          <a:stretch/>
+        </p:blipFill>
+        <p:spPr>
+          <a:xfrm>
+            <a:off x="6791902" y="1356307"/>
+            <a:ext cx="3475903" cy="1605023"/>
+          </a:xfrm>
+          <a:prstGeom prst="rect">
+            <a:avLst/>
+          </a:prstGeom>
+          <a:ln>
+            <a:solidFill>
+              <a:schemeClr val="tx1"/>
+            </a:solidFill>
+          </a:ln>
+        </p:spPr>
+      </p:pic>
+      <p:cxnSp>
+        <p:nvCxnSpPr>
+          <p:cNvPr id="18" name="Gerade Verbindung mit Pfeil 17">
+            <a:extLst>
+              <a:ext uri="{FF2B5EF4-FFF2-40B4-BE49-F238E27FC236}">
+                <a16:creationId xmlns:a16="http://schemas.microsoft.com/office/drawing/2014/main" id="{FD6CBA2D-E279-4485-B80C-440A471B1D56}"/>
+              </a:ext>
+            </a:extLst>
+          </p:cNvPr>
+          <p:cNvCxnSpPr>
+            <a:cxnSpLocks/>
+          </p:cNvCxnSpPr>
+          <p:nvPr/>
+        </p:nvCxnSpPr>
+        <p:spPr>
+          <a:xfrm flipV="1">
+            <a:off x="6023871" y="2584401"/>
+            <a:ext cx="760837" cy="404849"/>
+          </a:xfrm>
+          <a:prstGeom prst="straightConnector1">
+            <a:avLst/>
+          </a:prstGeom>
+          <a:ln w="19050">
+            <a:solidFill>
+              <a:srgbClr val="C00000"/>
+            </a:solidFill>
+            <a:tailEnd type="triangle"/>
+          </a:ln>
+        </p:spPr>
+        <p:style>
+          <a:lnRef idx="1">
+            <a:schemeClr val="accent1"/>
+          </a:lnRef>
+          <a:fillRef idx="0">
+            <a:schemeClr val="accent1"/>
+          </a:fillRef>
+          <a:effectRef idx="0">
+            <a:schemeClr val="accent1"/>
+          </a:effectRef>
+          <a:fontRef idx="minor">
+            <a:schemeClr val="tx1"/>
+          </a:fontRef>
+        </p:style>
+      </p:cxnSp>
+      <p:sp>
+        <p:nvSpPr>
+          <p:cNvPr id="22" name="Textfeld 21">
+            <a:extLst>
+              <a:ext uri="{FF2B5EF4-FFF2-40B4-BE49-F238E27FC236}">
+                <a16:creationId xmlns:a16="http://schemas.microsoft.com/office/drawing/2014/main" id="{C3E7CF0C-3DF7-4573-B662-408DD9555A8B}"/>
+              </a:ext>
+            </a:extLst>
+          </p:cNvPr>
+          <p:cNvSpPr txBox="1"/>
+          <p:nvPr/>
+        </p:nvSpPr>
+        <p:spPr>
+          <a:xfrm>
+            <a:off x="1227837" y="1607592"/>
+            <a:ext cx="1884642" cy="646331"/>
+          </a:xfrm>
+          <a:prstGeom prst="rect">
+            <a:avLst/>
+          </a:prstGeom>
+          <a:noFill/>
+        </p:spPr>
+        <p:txBody>
+          <a:bodyPr wrap="square" rtlCol="0">
+            <a:spAutoFit/>
+          </a:bodyPr>
+          <a:lstStyle/>
+          <a:p>
+            <a:pPr algn="ctr"/>
+            <a:r>
+              <a:rPr lang="de-DE" dirty="0"/>
+              <a:t>API-Manager</a:t>
+            </a:r>
+          </a:p>
+          <a:p>
+            <a:pPr algn="ctr"/>
+            <a:r>
+              <a:rPr lang="de-DE" dirty="0"/>
+              <a:t>Custom-Property</a:t>
+            </a:r>
+            <a:endParaRPr lang="en-US" dirty="0"/>
+          </a:p>
+        </p:txBody>
+      </p:sp>
+      <p:sp>
+        <p:nvSpPr>
+          <p:cNvPr id="23" name="Textfeld 22">
+            <a:extLst>
+              <a:ext uri="{FF2B5EF4-FFF2-40B4-BE49-F238E27FC236}">
+                <a16:creationId xmlns:a16="http://schemas.microsoft.com/office/drawing/2014/main" id="{74CB5D3D-425F-4F53-A1F3-DA359EAC1E86}"/>
+              </a:ext>
+            </a:extLst>
+          </p:cNvPr>
+          <p:cNvSpPr txBox="1"/>
+          <p:nvPr/>
+        </p:nvSpPr>
+        <p:spPr>
+          <a:xfrm>
+            <a:off x="3961342" y="1762661"/>
+            <a:ext cx="1884642" cy="369332"/>
+          </a:xfrm>
+          <a:prstGeom prst="rect">
+            <a:avLst/>
+          </a:prstGeom>
+          <a:noFill/>
+        </p:spPr>
+        <p:txBody>
+          <a:bodyPr wrap="square" rtlCol="0">
+            <a:spAutoFit/>
+          </a:bodyPr>
+          <a:lstStyle/>
+          <a:p>
+            <a:pPr algn="ctr"/>
+            <a:r>
+              <a:rPr lang="de-DE" dirty="0"/>
+              <a:t>Sample </a:t>
+            </a:r>
+            <a:r>
+              <a:rPr lang="de-DE" dirty="0" err="1"/>
+              <a:t>policy</a:t>
+            </a:r>
+            <a:endParaRPr lang="en-US" dirty="0"/>
+          </a:p>
+        </p:txBody>
+      </p:sp>
+    </p:spTree>
+    <p:extLst>
+      <p:ext uri="{BB962C8B-B14F-4D97-AF65-F5344CB8AC3E}">
+        <p14:creationId xmlns:p14="http://schemas.microsoft.com/office/powerpoint/2010/main" val="2186790322"/>
+      </p:ext>
+    </p:extLst>
+  </p:cSld>
+  <p:clrMapOvr>
+    <a:masterClrMapping/>
+  </p:clrMapOvr>
+</p:sld>
+</file>
+
 <file path=ppt/theme/theme1.xml><?xml version="1.0" encoding="utf-8"?>
 <a:theme xmlns:a="http://schemas.openxmlformats.org/drawingml/2006/main" name="Office">
   <a:themeElements>

</xml_diff>